<commit_message>
Notebook improvement + presentation expansion
</commit_message>
<xml_diff>
--- a/validation_and_random_forests.pptx
+++ b/validation_and_random_forests.pptx
@@ -5,7 +5,7 @@
     <p:sldMasterId id="2147483672" r:id="rId1"/>
   </p:sldMasterIdLst>
   <p:notesMasterIdLst>
-    <p:notesMasterId r:id="rId25"/>
+    <p:notesMasterId r:id="rId27"/>
   </p:notesMasterIdLst>
   <p:sldIdLst>
     <p:sldId id="293" r:id="rId2"/>
@@ -28,9 +28,11 @@
     <p:sldId id="311" r:id="rId19"/>
     <p:sldId id="330" r:id="rId20"/>
     <p:sldId id="331" r:id="rId21"/>
-    <p:sldId id="334" r:id="rId22"/>
-    <p:sldId id="333" r:id="rId23"/>
-    <p:sldId id="326" r:id="rId24"/>
+    <p:sldId id="342" r:id="rId22"/>
+    <p:sldId id="343" r:id="rId23"/>
+    <p:sldId id="344" r:id="rId24"/>
+    <p:sldId id="333" r:id="rId25"/>
+    <p:sldId id="326" r:id="rId26"/>
   </p:sldIdLst>
   <p:sldSz cx="9144000" cy="5143500" type="screen16x9"/>
   <p:notesSz cx="6858000" cy="9144000"/>
@@ -219,7 +221,7 @@
           <a:p>
             <a:fld id="{DDF2FCE7-7AFA-9242-BECB-A61CE0BE95A1}" type="datetimeFigureOut">
               <a:rPr lang="nl-NL" smtClean="0"/>
-              <a:t>27-5-2019</a:t>
+              <a:t>28-5-2019</a:t>
             </a:fld>
             <a:endParaRPr lang="nl-NL"/>
           </a:p>
@@ -846,7 +848,7 @@
           <a:p>
             <a:fld id="{A9710CDB-38B1-8E43-A846-6FE3B07A872E}" type="datetime1">
               <a:rPr lang="en-US" noProof="0" smtClean="0"/>
-              <a:t>5/27/2019</a:t>
+              <a:t>5/28/2019</a:t>
             </a:fld>
             <a:endParaRPr lang="nl-NL" noProof="0" dirty="0"/>
           </a:p>
@@ -1240,7 +1242,7 @@
           <a:p>
             <a:fld id="{12D8B67E-1464-254D-876A-5A059C6CA686}" type="datetime1">
               <a:rPr lang="en-US" smtClean="0"/>
-              <a:t>5/27/2019</a:t>
+              <a:t>5/28/2019</a:t>
             </a:fld>
             <a:endParaRPr lang="nl-NL"/>
           </a:p>
@@ -1658,7 +1660,7 @@
           <a:p>
             <a:fld id="{1297756A-AF1A-B249-A7CF-A1AE4E86FA38}" type="datetime1">
               <a:rPr lang="en-US" smtClean="0"/>
-              <a:t>5/27/2019</a:t>
+              <a:t>5/28/2019</a:t>
             </a:fld>
             <a:endParaRPr lang="nl-NL"/>
           </a:p>
@@ -2018,7 +2020,7 @@
           <a:p>
             <a:fld id="{37C8E900-D3BD-ED44-9070-3471A5611DC2}" type="datetime1">
               <a:rPr lang="en-US" smtClean="0"/>
-              <a:t>5/27/2019</a:t>
+              <a:t>5/28/2019</a:t>
             </a:fld>
             <a:endParaRPr lang="nl-NL"/>
           </a:p>
@@ -2195,7 +2197,7 @@
           <a:p>
             <a:fld id="{203D5A3F-EB4E-3340-8D19-07B028CB11AD}" type="datetime1">
               <a:rPr lang="en-US" smtClean="0"/>
-              <a:t>5/27/2019</a:t>
+              <a:t>5/28/2019</a:t>
             </a:fld>
             <a:endParaRPr lang="nl-NL"/>
           </a:p>
@@ -3121,7 +3123,7 @@
           <a:p>
             <a:fld id="{405216DA-0E4B-CC41-ACBF-76C3BC02E189}" type="datetime1">
               <a:rPr lang="en-US" smtClean="0"/>
-              <a:t>5/27/2019</a:t>
+              <a:t>5/28/2019</a:t>
             </a:fld>
             <a:endParaRPr lang="nl-NL"/>
           </a:p>
@@ -3368,7 +3370,7 @@
           <a:p>
             <a:fld id="{779D8D44-D820-BB49-9309-B66E37C4EE70}" type="datetime1">
               <a:rPr lang="en-US" smtClean="0"/>
-              <a:t>5/27/2019</a:t>
+              <a:t>5/28/2019</a:t>
             </a:fld>
             <a:endParaRPr lang="nl-NL"/>
           </a:p>
@@ -3617,7 +3619,7 @@
           <a:p>
             <a:fld id="{A4AB6030-B80C-7C4C-B97F-1ADFAB53E146}" type="datetime1">
               <a:rPr lang="en-US" smtClean="0"/>
-              <a:t>5/27/2019</a:t>
+              <a:t>5/28/2019</a:t>
             </a:fld>
             <a:endParaRPr lang="nl-NL"/>
           </a:p>
@@ -3783,7 +3785,7 @@
           <a:p>
             <a:fld id="{DA73B474-0AB7-8846-BA6A-67033A8CF4FA}" type="datetime1">
               <a:rPr lang="en-US" smtClean="0"/>
-              <a:t>5/27/2019</a:t>
+              <a:t>5/28/2019</a:t>
             </a:fld>
             <a:endParaRPr lang="nl-NL"/>
           </a:p>
@@ -4244,7 +4246,7 @@
           <a:p>
             <a:fld id="{56BA50C8-7311-E14C-816D-7251E320C8DC}" type="datetime1">
               <a:rPr lang="en-US" smtClean="0"/>
-              <a:t>5/27/2019</a:t>
+              <a:t>5/28/2019</a:t>
             </a:fld>
             <a:endParaRPr lang="nl-NL"/>
           </a:p>
@@ -4855,7 +4857,7 @@
           <a:p>
             <a:fld id="{A9710CDB-38B1-8E43-A846-6FE3B07A872E}" type="datetime1">
               <a:rPr lang="en-US" noProof="0" smtClean="0"/>
-              <a:t>5/27/2019</a:t>
+              <a:t>5/28/2019</a:t>
             </a:fld>
             <a:endParaRPr lang="nl-NL" noProof="0" dirty="0"/>
           </a:p>
@@ -5169,7 +5171,7 @@
           <a:p>
             <a:fld id="{E300D605-E2BB-8B4E-A2F3-5A64231C34A6}" type="datetime1">
               <a:rPr lang="en-US" smtClean="0"/>
-              <a:t>5/27/2019</a:t>
+              <a:t>5/28/2019</a:t>
             </a:fld>
             <a:endParaRPr lang="nl-NL"/>
           </a:p>
@@ -6453,12 +6455,8 @@
           <a:lstStyle/>
           <a:p>
             <a:r>
-              <a:rPr lang="nl-NL" dirty="0" err="1"/>
-              <a:t>Handson</a:t>
-            </a:r>
-            <a:r>
-              <a:rPr lang="nl-NL" dirty="0"/>
-              <a:t> met Random </a:t>
+              <a:rPr lang="nl-NL" dirty="0"/>
+              <a:t>Opfrisser Random </a:t>
             </a:r>
             <a:r>
               <a:rPr lang="nl-NL" dirty="0" err="1"/>
@@ -7556,12 +7554,8 @@
           <a:lstStyle/>
           <a:p>
             <a:r>
-              <a:rPr lang="nl-NL" dirty="0" err="1"/>
-              <a:t>Handson</a:t>
-            </a:r>
-            <a:r>
-              <a:rPr lang="nl-NL" dirty="0"/>
-              <a:t> met Random </a:t>
+              <a:rPr lang="nl-NL" dirty="0"/>
+              <a:t>Opfrisser Random </a:t>
             </a:r>
             <a:r>
               <a:rPr lang="nl-NL" dirty="0" err="1"/>
@@ -8356,8 +8350,13 @@
           <a:p>
             <a:r>
               <a:rPr lang="nl-NL" dirty="0"/>
-              <a:t>Introductie in R</a:t>
-            </a:r>
+              <a:t>Opfrisser Random </a:t>
+            </a:r>
+            <a:r>
+              <a:rPr lang="nl-NL" dirty="0" err="1"/>
+              <a:t>Forests</a:t>
+            </a:r>
+            <a:endParaRPr lang="nl-NL" dirty="0"/>
           </a:p>
         </p:txBody>
       </p:sp>
@@ -9459,16 +9458,12 @@
           <a:lstStyle/>
           <a:p>
             <a:r>
+              <a:rPr lang="nl-NL" dirty="0"/>
+              <a:t>Opfrisser Random </a:t>
+            </a:r>
+            <a:r>
               <a:rPr lang="nl-NL" dirty="0" err="1"/>
-              <a:t>Handson</a:t>
-            </a:r>
-            <a:r>
-              <a:rPr lang="nl-NL" dirty="0"/>
-              <a:t> met Random </a:t>
-            </a:r>
-            <a:r>
-              <a:rPr lang="nl-NL" dirty="0" err="1"/>
-              <a:t>Forest</a:t>
+              <a:t>Forests</a:t>
             </a:r>
             <a:endParaRPr lang="nl-NL" dirty="0"/>
           </a:p>
@@ -9728,16 +9723,12 @@
           <a:lstStyle/>
           <a:p>
             <a:r>
+              <a:rPr lang="nl-NL" dirty="0"/>
+              <a:t>Opfrisser Random </a:t>
+            </a:r>
+            <a:r>
               <a:rPr lang="nl-NL" dirty="0" err="1"/>
-              <a:t>Handson</a:t>
-            </a:r>
-            <a:r>
-              <a:rPr lang="nl-NL" dirty="0"/>
-              <a:t> met Random </a:t>
-            </a:r>
-            <a:r>
-              <a:rPr lang="nl-NL" dirty="0" err="1"/>
-              <a:t>Forest</a:t>
+              <a:t>Forests</a:t>
             </a:r>
             <a:endParaRPr lang="nl-NL" dirty="0"/>
           </a:p>
@@ -9878,7 +9869,7 @@
           <a:p>
             <a:r>
               <a:rPr lang="nl-NL" dirty="0"/>
-              <a:t>1 grote dataset: veel onzekerheid/variantie</a:t>
+              <a:t>1 grote dataset: veel onzekerheid</a:t>
             </a:r>
           </a:p>
           <a:p>
@@ -9917,13 +9908,14 @@
           <a:lstStyle/>
           <a:p>
             <a:r>
+              <a:rPr lang="nl-NL" dirty="0"/>
+              <a:t>Opfrisser Random </a:t>
+            </a:r>
+            <a:r>
               <a:rPr lang="nl-NL" dirty="0" err="1"/>
-              <a:t>Handson</a:t>
-            </a:r>
-            <a:r>
-              <a:rPr lang="nl-NL" dirty="0"/>
-              <a:t> met validatie</a:t>
-            </a:r>
+              <a:t>Forests</a:t>
+            </a:r>
+            <a:endParaRPr lang="nl-NL" dirty="0"/>
           </a:p>
         </p:txBody>
       </p:sp>
@@ -10390,16 +10382,12 @@
           <a:lstStyle/>
           <a:p>
             <a:r>
+              <a:rPr lang="nl-NL" dirty="0"/>
+              <a:t>Opfrisser Random </a:t>
+            </a:r>
+            <a:r>
               <a:rPr lang="nl-NL" dirty="0" err="1"/>
-              <a:t>Handson</a:t>
-            </a:r>
-            <a:r>
-              <a:rPr lang="nl-NL" dirty="0"/>
-              <a:t> met Random </a:t>
-            </a:r>
-            <a:r>
-              <a:rPr lang="nl-NL" dirty="0" err="1"/>
-              <a:t>Forest</a:t>
+              <a:t>Forests</a:t>
             </a:r>
             <a:endParaRPr lang="nl-NL" dirty="0"/>
           </a:p>
@@ -10505,24 +10493,40 @@
           <a:p>
             <a:r>
               <a:rPr lang="nl-NL" dirty="0"/>
-              <a:t>Meer over Random </a:t>
+              <a:t>Random </a:t>
             </a:r>
             <a:r>
               <a:rPr lang="nl-NL" dirty="0" err="1"/>
               <a:t>Forest</a:t>
             </a:r>
+            <a:r>
+              <a:rPr lang="nl-NL" dirty="0"/>
+              <a:t> bouwen met </a:t>
+            </a:r>
+            <a:r>
+              <a:rPr lang="nl-NL" dirty="0" err="1"/>
+              <a:t>SciKit</a:t>
+            </a:r>
+            <a:r>
+              <a:rPr lang="nl-NL" dirty="0"/>
+              <a:t> </a:t>
+            </a:r>
+            <a:r>
+              <a:rPr lang="nl-NL" dirty="0" err="1"/>
+              <a:t>Learn</a:t>
+            </a:r>
             <a:endParaRPr lang="nl-NL" dirty="0"/>
           </a:p>
         </p:txBody>
       </p:sp>
       <p:sp>
         <p:nvSpPr>
-          <p:cNvPr id="3" name="Content Placeholder 2"/>
-          <p:cNvSpPr>
-            <a:spLocks noGrp="1"/>
-          </p:cNvSpPr>
-          <p:nvPr>
-            <p:ph idx="1"/>
+          <p:cNvPr id="4" name="Footer Placeholder 3"/>
+          <p:cNvSpPr>
+            <a:spLocks noGrp="1"/>
+          </p:cNvSpPr>
+          <p:nvPr>
+            <p:ph type="ftr" sz="quarter" idx="11"/>
           </p:nvPr>
         </p:nvSpPr>
         <p:spPr/>
@@ -10532,72 +10536,11 @@
           <a:p>
             <a:r>
               <a:rPr lang="nl-NL" dirty="0"/>
-              <a:t>Vandaag korte </a:t>
+              <a:t>Opfrisser Random </a:t>
             </a:r>
             <a:r>
               <a:rPr lang="nl-NL" dirty="0" err="1"/>
-              <a:t>overview</a:t>
-            </a:r>
-            <a:endParaRPr lang="nl-NL" dirty="0"/>
-          </a:p>
-          <a:p>
-            <a:r>
-              <a:rPr lang="nl-NL" dirty="0"/>
-              <a:t>Nadruk op werking van het algoritme, niet op het bouwen van een perfect model</a:t>
-            </a:r>
-          </a:p>
-          <a:p>
-            <a:r>
-              <a:rPr lang="nl-NL" dirty="0"/>
-              <a:t>Meer leren? Dingen om zelf op te zoeken:</a:t>
-            </a:r>
-          </a:p>
-          <a:p>
-            <a:pPr lvl="1"/>
-            <a:r>
-              <a:rPr lang="nl-NL" dirty="0" err="1"/>
-              <a:t>Tuning</a:t>
-            </a:r>
-            <a:r>
-              <a:rPr lang="nl-NL" dirty="0"/>
-              <a:t> (“perfectioneren van je model”)</a:t>
-            </a:r>
-          </a:p>
-          <a:p>
-            <a:pPr lvl="1"/>
-            <a:r>
-              <a:rPr lang="nl-NL" dirty="0"/>
-              <a:t>Gini index (“welke variabelen hebben de meeste en de minste impact?”)</a:t>
-            </a:r>
-          </a:p>
-        </p:txBody>
-      </p:sp>
-      <p:sp>
-        <p:nvSpPr>
-          <p:cNvPr id="4" name="Footer Placeholder 3"/>
-          <p:cNvSpPr>
-            <a:spLocks noGrp="1"/>
-          </p:cNvSpPr>
-          <p:nvPr>
-            <p:ph type="ftr" sz="quarter" idx="11"/>
-          </p:nvPr>
-        </p:nvSpPr>
-        <p:spPr/>
-        <p:txBody>
-          <a:bodyPr/>
-          <a:lstStyle/>
-          <a:p>
-            <a:r>
-              <a:rPr lang="nl-NL" dirty="0" err="1"/>
-              <a:t>Handson</a:t>
-            </a:r>
-            <a:r>
-              <a:rPr lang="nl-NL" dirty="0"/>
-              <a:t> met Random </a:t>
-            </a:r>
-            <a:r>
-              <a:rPr lang="nl-NL" dirty="0" err="1"/>
-              <a:t>Forest</a:t>
+              <a:t>Forests</a:t>
             </a:r>
             <a:endParaRPr lang="nl-NL" dirty="0"/>
           </a:p>
@@ -10628,38 +10571,98 @@
       </p:sp>
       <p:pic>
         <p:nvPicPr>
-          <p:cNvPr id="9" name="Picture 8"/>
+          <p:cNvPr id="10" name="Picture 9">
+            <a:extLst>
+              <a:ext uri="{FF2B5EF4-FFF2-40B4-BE49-F238E27FC236}">
+                <a16:creationId xmlns:a16="http://schemas.microsoft.com/office/drawing/2014/main" id="{C3B08422-FBF0-44FA-9D83-35008DDC8185}"/>
+              </a:ext>
+            </a:extLst>
+          </p:cNvPr>
           <p:cNvPicPr>
             <a:picLocks noChangeAspect="1"/>
           </p:cNvPicPr>
           <p:nvPr/>
         </p:nvPicPr>
         <p:blipFill>
-          <a:blip r:embed="rId2">
-            <a:extLst>
-              <a:ext uri="{28A0092B-C50C-407E-A947-70E740481C1C}">
-                <a14:useLocalDpi xmlns:a14="http://schemas.microsoft.com/office/drawing/2010/main" val="0"/>
-              </a:ext>
-            </a:extLst>
-          </a:blip>
+          <a:blip r:embed="rId2"/>
           <a:stretch>
             <a:fillRect/>
           </a:stretch>
         </p:blipFill>
         <p:spPr>
           <a:xfrm>
-            <a:off x="4464000" y="1332177"/>
-            <a:ext cx="4679999" cy="2340171"/>
+            <a:off x="0" y="791999"/>
+            <a:ext cx="9144000" cy="2364673"/>
           </a:xfrm>
           <a:prstGeom prst="rect">
             <a:avLst/>
           </a:prstGeom>
         </p:spPr>
       </p:pic>
+      <p:sp>
+        <p:nvSpPr>
+          <p:cNvPr id="3" name="TextBox 2">
+            <a:extLst>
+              <a:ext uri="{FF2B5EF4-FFF2-40B4-BE49-F238E27FC236}">
+                <a16:creationId xmlns:a16="http://schemas.microsoft.com/office/drawing/2014/main" id="{262A7AD2-BFAF-4749-A70A-6704561E079B}"/>
+              </a:ext>
+            </a:extLst>
+          </p:cNvPr>
+          <p:cNvSpPr txBox="1"/>
+          <p:nvPr/>
+        </p:nvSpPr>
+        <p:spPr>
+          <a:xfrm>
+            <a:off x="95250" y="3247995"/>
+            <a:ext cx="2906245" cy="200055"/>
+          </a:xfrm>
+          <a:prstGeom prst="rect">
+            <a:avLst/>
+          </a:prstGeom>
+          <a:noFill/>
+        </p:spPr>
+        <p:txBody>
+          <a:bodyPr wrap="square" lIns="0" tIns="0" rIns="0" bIns="0" rtlCol="0">
+            <a:spAutoFit/>
+          </a:bodyPr>
+          <a:lstStyle/>
+          <a:p>
+            <a:r>
+              <a:rPr lang="nl-NL" sz="1300" dirty="0">
+                <a:solidFill>
+                  <a:schemeClr val="bg1"/>
+                </a:solidFill>
+              </a:rPr>
+              <a:t>Splits de data in training en </a:t>
+            </a:r>
+            <a:r>
+              <a:rPr lang="nl-NL" sz="1300" dirty="0" err="1">
+                <a:solidFill>
+                  <a:schemeClr val="bg1"/>
+                </a:solidFill>
+              </a:rPr>
+              <a:t>testing</a:t>
+            </a:r>
+            <a:r>
+              <a:rPr lang="nl-NL" sz="1300" dirty="0">
+                <a:solidFill>
+                  <a:schemeClr val="bg1"/>
+                </a:solidFill>
+              </a:rPr>
+              <a:t> sets</a:t>
+            </a:r>
+            <a:endParaRPr lang="en-NL" sz="1300" dirty="0" err="1">
+              <a:solidFill>
+                <a:schemeClr val="bg1"/>
+              </a:solidFill>
+            </a:endParaRPr>
+          </a:p>
+        </p:txBody>
+      </p:sp>
     </p:spTree>
     <p:extLst>
       <p:ext uri="{BB962C8B-B14F-4D97-AF65-F5344CB8AC3E}">
-        <p14:creationId xmlns:p14="http://schemas.microsoft.com/office/powerpoint/2010/main" val="4240991050"/>
+        <p14:creationId xmlns:p14="http://schemas.microsoft.com/office/powerpoint/2010/main" val="3845362099"/>
       </p:ext>
     </p:extLst>
   </p:cSld>
@@ -10703,6 +10706,932 @@
           <a:p>
             <a:r>
               <a:rPr lang="nl-NL" dirty="0"/>
+              <a:t>Random </a:t>
+            </a:r>
+            <a:r>
+              <a:rPr lang="nl-NL" dirty="0" err="1"/>
+              <a:t>Forest</a:t>
+            </a:r>
+            <a:r>
+              <a:rPr lang="nl-NL" dirty="0"/>
+              <a:t> bouwen met </a:t>
+            </a:r>
+            <a:r>
+              <a:rPr lang="nl-NL" dirty="0" err="1"/>
+              <a:t>SciKit</a:t>
+            </a:r>
+            <a:r>
+              <a:rPr lang="nl-NL" dirty="0"/>
+              <a:t> </a:t>
+            </a:r>
+            <a:r>
+              <a:rPr lang="nl-NL" dirty="0" err="1"/>
+              <a:t>Learn</a:t>
+            </a:r>
+            <a:endParaRPr lang="nl-NL" dirty="0"/>
+          </a:p>
+        </p:txBody>
+      </p:sp>
+      <p:sp>
+        <p:nvSpPr>
+          <p:cNvPr id="4" name="Footer Placeholder 3"/>
+          <p:cNvSpPr>
+            <a:spLocks noGrp="1"/>
+          </p:cNvSpPr>
+          <p:nvPr>
+            <p:ph type="ftr" sz="quarter" idx="11"/>
+          </p:nvPr>
+        </p:nvSpPr>
+        <p:spPr/>
+        <p:txBody>
+          <a:bodyPr/>
+          <a:lstStyle/>
+          <a:p>
+            <a:r>
+              <a:rPr lang="nl-NL" dirty="0"/>
+              <a:t>Opfrisser Random </a:t>
+            </a:r>
+            <a:r>
+              <a:rPr lang="nl-NL" dirty="0" err="1"/>
+              <a:t>Forests</a:t>
+            </a:r>
+            <a:endParaRPr lang="nl-NL" dirty="0"/>
+          </a:p>
+        </p:txBody>
+      </p:sp>
+      <p:sp>
+        <p:nvSpPr>
+          <p:cNvPr id="5" name="Slide Number Placeholder 4"/>
+          <p:cNvSpPr>
+            <a:spLocks noGrp="1"/>
+          </p:cNvSpPr>
+          <p:nvPr>
+            <p:ph type="sldNum" sz="quarter" idx="12"/>
+          </p:nvPr>
+        </p:nvSpPr>
+        <p:spPr/>
+        <p:txBody>
+          <a:bodyPr/>
+          <a:lstStyle/>
+          <a:p>
+            <a:fld id="{14F1411D-0280-154F-AEAC-4C20B7AA46B2}" type="slidenum">
+              <a:rPr lang="nl-NL" smtClean="0"/>
+              <a:t>22</a:t>
+            </a:fld>
+            <a:endParaRPr lang="nl-NL"/>
+          </a:p>
+        </p:txBody>
+      </p:sp>
+      <p:sp>
+        <p:nvSpPr>
+          <p:cNvPr id="3" name="TextBox 2">
+            <a:extLst>
+              <a:ext uri="{FF2B5EF4-FFF2-40B4-BE49-F238E27FC236}">
+                <a16:creationId xmlns:a16="http://schemas.microsoft.com/office/drawing/2014/main" id="{262A7AD2-BFAF-4749-A70A-6704561E079B}"/>
+              </a:ext>
+            </a:extLst>
+          </p:cNvPr>
+          <p:cNvSpPr txBox="1"/>
+          <p:nvPr/>
+        </p:nvSpPr>
+        <p:spPr>
+          <a:xfrm>
+            <a:off x="104775" y="2030833"/>
+            <a:ext cx="8934450" cy="800219"/>
+          </a:xfrm>
+          <a:prstGeom prst="rect">
+            <a:avLst/>
+          </a:prstGeom>
+          <a:noFill/>
+        </p:spPr>
+        <p:txBody>
+          <a:bodyPr wrap="square" lIns="0" tIns="0" rIns="0" bIns="0" rtlCol="0">
+            <a:spAutoFit/>
+          </a:bodyPr>
+          <a:lstStyle/>
+          <a:p>
+            <a:pPr marL="342900" indent="-342900">
+              <a:buFont typeface="+mj-lt"/>
+              <a:buAutoNum type="arabicPeriod"/>
+            </a:pPr>
+            <a:r>
+              <a:rPr lang="nl-NL" sz="1300" dirty="0">
+                <a:solidFill>
+                  <a:schemeClr val="bg1"/>
+                </a:solidFill>
+              </a:rPr>
+              <a:t>Creëer een Random </a:t>
+            </a:r>
+            <a:r>
+              <a:rPr lang="nl-NL" sz="1300" dirty="0" err="1">
+                <a:solidFill>
+                  <a:schemeClr val="bg1"/>
+                </a:solidFill>
+              </a:rPr>
+              <a:t>Forest</a:t>
+            </a:r>
+            <a:r>
+              <a:rPr lang="nl-NL" sz="1300" dirty="0">
+                <a:solidFill>
+                  <a:schemeClr val="bg1"/>
+                </a:solidFill>
+              </a:rPr>
+              <a:t> met bepaalde parameters</a:t>
+            </a:r>
+          </a:p>
+          <a:p>
+            <a:pPr marL="342900" indent="-342900">
+              <a:buFont typeface="+mj-lt"/>
+              <a:buAutoNum type="arabicPeriod"/>
+            </a:pPr>
+            <a:r>
+              <a:rPr lang="nl-NL" sz="1300" dirty="0">
+                <a:solidFill>
+                  <a:schemeClr val="bg1"/>
+                </a:solidFill>
+              </a:rPr>
+              <a:t>Fit het Random </a:t>
+            </a:r>
+            <a:r>
+              <a:rPr lang="nl-NL" sz="1300" dirty="0" err="1">
+                <a:solidFill>
+                  <a:schemeClr val="bg1"/>
+                </a:solidFill>
+              </a:rPr>
+              <a:t>Forest</a:t>
+            </a:r>
+            <a:r>
+              <a:rPr lang="nl-NL" sz="1300" dirty="0">
+                <a:solidFill>
+                  <a:schemeClr val="bg1"/>
+                </a:solidFill>
+              </a:rPr>
+              <a:t> met de training en de </a:t>
+            </a:r>
+            <a:r>
+              <a:rPr lang="nl-NL" sz="1300" dirty="0" err="1">
+                <a:solidFill>
+                  <a:schemeClr val="bg1"/>
+                </a:solidFill>
+              </a:rPr>
+              <a:t>testing</a:t>
+            </a:r>
+            <a:r>
+              <a:rPr lang="nl-NL" sz="1300" dirty="0">
+                <a:solidFill>
+                  <a:schemeClr val="bg1"/>
+                </a:solidFill>
+              </a:rPr>
+              <a:t> set met </a:t>
+            </a:r>
+            <a:r>
+              <a:rPr lang="nl-NL" sz="1300" dirty="0" err="1">
+                <a:solidFill>
+                  <a:schemeClr val="bg1"/>
+                </a:solidFill>
+              </a:rPr>
+              <a:t>RandomForestClassifier.fit</a:t>
+            </a:r>
+            <a:r>
+              <a:rPr lang="nl-NL" sz="1300" dirty="0">
+                <a:solidFill>
+                  <a:schemeClr val="bg1"/>
+                </a:solidFill>
+              </a:rPr>
+              <a:t>()</a:t>
+            </a:r>
+          </a:p>
+          <a:p>
+            <a:pPr marL="342900" indent="-342900">
+              <a:buFont typeface="+mj-lt"/>
+              <a:buAutoNum type="arabicPeriod"/>
+            </a:pPr>
+            <a:r>
+              <a:rPr lang="nl-NL" sz="1300" dirty="0">
+                <a:solidFill>
+                  <a:schemeClr val="bg1"/>
+                </a:solidFill>
+              </a:rPr>
+              <a:t>Voorspel de waarden </a:t>
+            </a:r>
+            <a:r>
+              <a:rPr lang="nl-NL" sz="1300" dirty="0" err="1">
+                <a:solidFill>
+                  <a:schemeClr val="bg1"/>
+                </a:solidFill>
+              </a:rPr>
+              <a:t>RandomForestClassifier.predict</a:t>
+            </a:r>
+            <a:r>
+              <a:rPr lang="nl-NL" sz="1300" dirty="0">
+                <a:solidFill>
+                  <a:schemeClr val="bg1"/>
+                </a:solidFill>
+              </a:rPr>
+              <a:t>()</a:t>
+            </a:r>
+          </a:p>
+          <a:p>
+            <a:pPr marL="342900" indent="-342900">
+              <a:buFont typeface="+mj-lt"/>
+              <a:buAutoNum type="arabicPeriod"/>
+            </a:pPr>
+            <a:r>
+              <a:rPr lang="nl-NL" sz="1300" dirty="0">
+                <a:solidFill>
+                  <a:schemeClr val="bg1"/>
+                </a:solidFill>
+              </a:rPr>
+              <a:t>Bekijk hoe accuraat je model is met </a:t>
+            </a:r>
+            <a:r>
+              <a:rPr lang="nl-NL" sz="1300" dirty="0" err="1">
+                <a:solidFill>
+                  <a:schemeClr val="bg1"/>
+                </a:solidFill>
+              </a:rPr>
+              <a:t>accuracy_score</a:t>
+            </a:r>
+            <a:r>
+              <a:rPr lang="nl-NL" sz="1300" dirty="0">
+                <a:solidFill>
+                  <a:schemeClr val="bg1"/>
+                </a:solidFill>
+              </a:rPr>
+              <a:t>()</a:t>
+            </a:r>
+            <a:endParaRPr lang="en-NL" sz="1300" dirty="0" err="1">
+              <a:solidFill>
+                <a:schemeClr val="bg1"/>
+              </a:solidFill>
+            </a:endParaRPr>
+          </a:p>
+        </p:txBody>
+      </p:sp>
+      <p:pic>
+        <p:nvPicPr>
+          <p:cNvPr id="6" name="Picture 5">
+            <a:extLst>
+              <a:ext uri="{FF2B5EF4-FFF2-40B4-BE49-F238E27FC236}">
+                <a16:creationId xmlns:a16="http://schemas.microsoft.com/office/drawing/2014/main" id="{B980885C-2897-4235-B420-7A70656B03AE}"/>
+              </a:ext>
+            </a:extLst>
+          </p:cNvPr>
+          <p:cNvPicPr>
+            <a:picLocks noChangeAspect="1"/>
+          </p:cNvPicPr>
+          <p:nvPr/>
+        </p:nvPicPr>
+        <p:blipFill>
+          <a:blip r:embed="rId2"/>
+          <a:stretch>
+            <a:fillRect/>
+          </a:stretch>
+        </p:blipFill>
+        <p:spPr>
+          <a:xfrm>
+            <a:off x="0" y="791999"/>
+            <a:ext cx="9144000" cy="1144117"/>
+          </a:xfrm>
+          <a:prstGeom prst="rect">
+            <a:avLst/>
+          </a:prstGeom>
+        </p:spPr>
+      </p:pic>
+    </p:spTree>
+    <p:extLst>
+      <p:ext uri="{BB962C8B-B14F-4D97-AF65-F5344CB8AC3E}">
+        <p14:creationId xmlns:p14="http://schemas.microsoft.com/office/powerpoint/2010/main" val="3012905318"/>
+      </p:ext>
+    </p:extLst>
+  </p:cSld>
+  <p:clrMapOvr>
+    <a:masterClrMapping/>
+  </p:clrMapOvr>
+</p:sld>
+</file>
+
+<file path=ppt/slides/slide23.xml><?xml version="1.0" encoding="utf-8"?>
+<p:sld xmlns:a="http://schemas.openxmlformats.org/drawingml/2006/main" xmlns:r="http://schemas.openxmlformats.org/officeDocument/2006/relationships" xmlns:p="http://schemas.openxmlformats.org/presentationml/2006/main">
+  <p:cSld>
+    <p:spTree>
+      <p:nvGrpSpPr>
+        <p:cNvPr id="1" name=""/>
+        <p:cNvGrpSpPr/>
+        <p:nvPr/>
+      </p:nvGrpSpPr>
+      <p:grpSpPr>
+        <a:xfrm>
+          <a:off x="0" y="0"/>
+          <a:ext cx="0" cy="0"/>
+          <a:chOff x="0" y="0"/>
+          <a:chExt cx="0" cy="0"/>
+        </a:xfrm>
+      </p:grpSpPr>
+      <p:sp>
+        <p:nvSpPr>
+          <p:cNvPr id="2" name="Title 1"/>
+          <p:cNvSpPr>
+            <a:spLocks noGrp="1"/>
+          </p:cNvSpPr>
+          <p:nvPr>
+            <p:ph type="title"/>
+          </p:nvPr>
+        </p:nvSpPr>
+        <p:spPr/>
+        <p:txBody>
+          <a:bodyPr/>
+          <a:lstStyle/>
+          <a:p>
+            <a:r>
+              <a:rPr lang="nl-NL" dirty="0"/>
+              <a:t>Random </a:t>
+            </a:r>
+            <a:r>
+              <a:rPr lang="nl-NL" dirty="0" err="1"/>
+              <a:t>Forest</a:t>
+            </a:r>
+            <a:r>
+              <a:rPr lang="nl-NL" dirty="0"/>
+              <a:t> bouwen met </a:t>
+            </a:r>
+            <a:r>
+              <a:rPr lang="nl-NL" dirty="0" err="1"/>
+              <a:t>SciKit</a:t>
+            </a:r>
+            <a:r>
+              <a:rPr lang="nl-NL" dirty="0"/>
+              <a:t> </a:t>
+            </a:r>
+            <a:r>
+              <a:rPr lang="nl-NL" dirty="0" err="1"/>
+              <a:t>Learn</a:t>
+            </a:r>
+            <a:r>
+              <a:rPr lang="nl-NL" dirty="0"/>
+              <a:t>: argumenten</a:t>
+            </a:r>
+          </a:p>
+        </p:txBody>
+      </p:sp>
+      <p:sp>
+        <p:nvSpPr>
+          <p:cNvPr id="3" name="Content Placeholder 2"/>
+          <p:cNvSpPr>
+            <a:spLocks noGrp="1"/>
+          </p:cNvSpPr>
+          <p:nvPr>
+            <p:ph idx="1"/>
+          </p:nvPr>
+        </p:nvSpPr>
+        <p:spPr/>
+        <p:txBody>
+          <a:bodyPr/>
+          <a:lstStyle/>
+          <a:p>
+            <a:pPr marL="342900" indent="-342900">
+              <a:buFont typeface="+mj-lt"/>
+              <a:buAutoNum type="arabicPeriod"/>
+            </a:pPr>
+            <a:r>
+              <a:rPr lang="nl-NL" dirty="0"/>
+              <a:t>Sample N cases met </a:t>
+            </a:r>
+            <a:r>
+              <a:rPr lang="nl-NL" dirty="0" err="1"/>
+              <a:t>replacement</a:t>
+            </a:r>
+            <a:r>
+              <a:rPr lang="nl-NL" dirty="0"/>
+              <a:t> (ongeveer 66% van totaal)</a:t>
+            </a:r>
+          </a:p>
+          <a:p>
+            <a:pPr marL="342900" indent="-342900">
+              <a:buFont typeface="+mj-lt"/>
+              <a:buAutoNum type="arabicPeriod"/>
+            </a:pPr>
+            <a:r>
+              <a:rPr lang="nl-NL" dirty="0"/>
+              <a:t>Maak 1 decision tree. Bij elke splitsing:</a:t>
+            </a:r>
+          </a:p>
+          <a:p>
+            <a:pPr marL="522900" lvl="1" indent="-342900">
+              <a:buFont typeface="+mj-lt"/>
+              <a:buAutoNum type="arabicPeriod"/>
+            </a:pPr>
+            <a:r>
+              <a:rPr lang="nl-NL" dirty="0"/>
+              <a:t>Sample </a:t>
+            </a:r>
+            <a:r>
+              <a:rPr lang="nl-NL" i="1" dirty="0"/>
+              <a:t>m</a:t>
+            </a:r>
+            <a:r>
+              <a:rPr lang="nl-NL" dirty="0"/>
+              <a:t> variabelen zonder </a:t>
+            </a:r>
+            <a:r>
+              <a:rPr lang="nl-NL" dirty="0" err="1"/>
+              <a:t>replacement</a:t>
+            </a:r>
+            <a:r>
+              <a:rPr lang="nl-NL" dirty="0"/>
+              <a:t> van </a:t>
+            </a:r>
+            <a:r>
+              <a:rPr lang="nl-NL" i="1" dirty="0"/>
+              <a:t>p</a:t>
+            </a:r>
+          </a:p>
+          <a:p>
+            <a:pPr marL="522900" lvl="1" indent="-342900">
+              <a:buFont typeface="+mj-lt"/>
+              <a:buAutoNum type="arabicPeriod"/>
+            </a:pPr>
+            <a:r>
+              <a:rPr lang="nl-NL" dirty="0"/>
+              <a:t>Kies de variabele die de meeste variantie verklaart</a:t>
+            </a:r>
+          </a:p>
+          <a:p>
+            <a:pPr marL="522900" lvl="1" indent="-342900">
+              <a:buFont typeface="+mj-lt"/>
+              <a:buAutoNum type="arabicPeriod"/>
+            </a:pPr>
+            <a:r>
+              <a:rPr lang="nl-NL" dirty="0"/>
+              <a:t>Ga naar de volgende node</a:t>
+            </a:r>
+          </a:p>
+          <a:p>
+            <a:pPr marL="342900" indent="-342900">
+              <a:buFont typeface="+mj-lt"/>
+              <a:buAutoNum type="arabicPeriod"/>
+            </a:pPr>
+            <a:r>
+              <a:rPr lang="nl-NL" dirty="0"/>
+              <a:t>Repeat 1-&gt;3 tot T decision trees</a:t>
+            </a:r>
+            <a:endParaRPr lang="nl-NL" i="1" dirty="0"/>
+          </a:p>
+          <a:p>
+            <a:pPr marL="0" indent="0">
+              <a:buNone/>
+            </a:pPr>
+            <a:r>
+              <a:rPr lang="nl-NL" i="1" dirty="0"/>
+              <a:t>m</a:t>
+            </a:r>
+            <a:r>
+              <a:rPr lang="nl-NL" dirty="0"/>
+              <a:t> is default voor classificatie </a:t>
+            </a:r>
+            <a:r>
+              <a:rPr lang="nl-NL" dirty="0" err="1"/>
+              <a:t>sqrt</a:t>
+            </a:r>
+            <a:r>
+              <a:rPr lang="nl-NL" dirty="0"/>
+              <a:t>(</a:t>
+            </a:r>
+            <a:r>
+              <a:rPr lang="nl-NL" i="1" dirty="0"/>
+              <a:t>p</a:t>
+            </a:r>
+            <a:r>
+              <a:rPr lang="nl-NL" dirty="0"/>
+              <a:t>)</a:t>
+            </a:r>
+          </a:p>
+          <a:p>
+            <a:pPr marL="0" indent="0">
+              <a:buNone/>
+            </a:pPr>
+            <a:r>
+              <a:rPr lang="nl-NL" i="1" dirty="0"/>
+              <a:t>m</a:t>
+            </a:r>
+            <a:r>
+              <a:rPr lang="nl-NL" dirty="0"/>
+              <a:t> is default voor regressie </a:t>
+            </a:r>
+            <a:r>
+              <a:rPr lang="nl-NL" i="1" dirty="0"/>
+              <a:t>p</a:t>
+            </a:r>
+            <a:r>
+              <a:rPr lang="nl-NL" dirty="0"/>
+              <a:t>/3</a:t>
+            </a:r>
+          </a:p>
+          <a:p>
+            <a:pPr marL="0" indent="0">
+              <a:buNone/>
+            </a:pPr>
+            <a:r>
+              <a:rPr lang="nl-NL" i="1" dirty="0"/>
+              <a:t>p</a:t>
+            </a:r>
+            <a:r>
+              <a:rPr lang="nl-NL" dirty="0"/>
+              <a:t> is het totale aantal variabelen</a:t>
+            </a:r>
+          </a:p>
+        </p:txBody>
+      </p:sp>
+      <p:sp>
+        <p:nvSpPr>
+          <p:cNvPr id="4" name="Footer Placeholder 3"/>
+          <p:cNvSpPr>
+            <a:spLocks noGrp="1"/>
+          </p:cNvSpPr>
+          <p:nvPr>
+            <p:ph type="ftr" sz="quarter" idx="11"/>
+          </p:nvPr>
+        </p:nvSpPr>
+        <p:spPr/>
+        <p:txBody>
+          <a:bodyPr/>
+          <a:lstStyle/>
+          <a:p>
+            <a:r>
+              <a:rPr lang="nl-NL" dirty="0"/>
+              <a:t>Opfrisser Random </a:t>
+            </a:r>
+            <a:r>
+              <a:rPr lang="nl-NL" dirty="0" err="1"/>
+              <a:t>Forests</a:t>
+            </a:r>
+            <a:endParaRPr lang="nl-NL" dirty="0"/>
+          </a:p>
+        </p:txBody>
+      </p:sp>
+      <p:sp>
+        <p:nvSpPr>
+          <p:cNvPr id="5" name="Slide Number Placeholder 4"/>
+          <p:cNvSpPr>
+            <a:spLocks noGrp="1"/>
+          </p:cNvSpPr>
+          <p:nvPr>
+            <p:ph type="sldNum" sz="quarter" idx="12"/>
+          </p:nvPr>
+        </p:nvSpPr>
+        <p:spPr/>
+        <p:txBody>
+          <a:bodyPr/>
+          <a:lstStyle/>
+          <a:p>
+            <a:fld id="{14F1411D-0280-154F-AEAC-4C20B7AA46B2}" type="slidenum">
+              <a:rPr lang="nl-NL" smtClean="0"/>
+              <a:t>23</a:t>
+            </a:fld>
+            <a:endParaRPr lang="nl-NL"/>
+          </a:p>
+        </p:txBody>
+      </p:sp>
+      <p:sp>
+        <p:nvSpPr>
+          <p:cNvPr id="7" name="Content Placeholder 2">
+            <a:extLst>
+              <a:ext uri="{FF2B5EF4-FFF2-40B4-BE49-F238E27FC236}">
+                <a16:creationId xmlns:a16="http://schemas.microsoft.com/office/drawing/2014/main" id="{1DB3B8EF-ECDF-4BAB-A395-7BA2BE48F11A}"/>
+              </a:ext>
+            </a:extLst>
+          </p:cNvPr>
+          <p:cNvSpPr txBox="1">
+            <a:spLocks/>
+          </p:cNvSpPr>
+          <p:nvPr/>
+        </p:nvSpPr>
+        <p:spPr>
+          <a:xfrm>
+            <a:off x="4464000" y="900001"/>
+            <a:ext cx="4070350" cy="3401999"/>
+          </a:xfrm>
+          <a:prstGeom prst="rect">
+            <a:avLst/>
+          </a:prstGeom>
+        </p:spPr>
+        <p:txBody>
+          <a:bodyPr vert="horz" lIns="0" tIns="0" rIns="0" bIns="0" rtlCol="0" anchor="t" anchorCtr="0">
+            <a:noAutofit/>
+          </a:bodyPr>
+          <a:lstStyle>
+            <a:lvl1pPr marL="180000" indent="-180000" algn="l" defTabSz="685800" rtl="0" eaLnBrk="1" latinLnBrk="0" hangingPunct="1">
+              <a:lnSpc>
+                <a:spcPct val="120000"/>
+              </a:lnSpc>
+              <a:spcBef>
+                <a:spcPts val="0"/>
+              </a:spcBef>
+              <a:buFont typeface="Arial" panose="020B0604020202020204" pitchFamily="34" charset="0"/>
+              <a:buChar char="•"/>
+              <a:defRPr sz="1500" kern="1200">
+                <a:solidFill>
+                  <a:schemeClr val="bg1"/>
+                </a:solidFill>
+                <a:latin typeface="+mn-lt"/>
+                <a:ea typeface="+mn-ea"/>
+                <a:cs typeface="+mn-cs"/>
+              </a:defRPr>
+            </a:lvl1pPr>
+            <a:lvl2pPr marL="360000" indent="-180000" algn="l" defTabSz="685800" rtl="0" eaLnBrk="1" latinLnBrk="0" hangingPunct="1">
+              <a:lnSpc>
+                <a:spcPct val="120000"/>
+              </a:lnSpc>
+              <a:spcBef>
+                <a:spcPts val="0"/>
+              </a:spcBef>
+              <a:buFont typeface="Arial" panose="020B0604020202020204" pitchFamily="34" charset="0"/>
+              <a:buChar char="•"/>
+              <a:defRPr sz="1500" kern="1200">
+                <a:solidFill>
+                  <a:schemeClr val="bg1"/>
+                </a:solidFill>
+                <a:latin typeface="+mn-lt"/>
+                <a:ea typeface="+mn-ea"/>
+                <a:cs typeface="+mn-cs"/>
+              </a:defRPr>
+            </a:lvl2pPr>
+            <a:lvl3pPr marL="540000" indent="-180000" algn="l" defTabSz="685800" rtl="0" eaLnBrk="1" latinLnBrk="0" hangingPunct="1">
+              <a:lnSpc>
+                <a:spcPct val="120000"/>
+              </a:lnSpc>
+              <a:spcBef>
+                <a:spcPts val="0"/>
+              </a:spcBef>
+              <a:buFont typeface="Arial" panose="020B0604020202020204" pitchFamily="34" charset="0"/>
+              <a:buChar char="•"/>
+              <a:defRPr sz="1500" kern="1200">
+                <a:solidFill>
+                  <a:schemeClr val="bg1"/>
+                </a:solidFill>
+                <a:latin typeface="+mn-lt"/>
+                <a:ea typeface="+mn-ea"/>
+                <a:cs typeface="+mn-cs"/>
+              </a:defRPr>
+            </a:lvl3pPr>
+            <a:lvl4pPr marL="720000" indent="-180000" algn="l" defTabSz="685800" rtl="0" eaLnBrk="1" latinLnBrk="0" hangingPunct="1">
+              <a:lnSpc>
+                <a:spcPct val="120000"/>
+              </a:lnSpc>
+              <a:spcBef>
+                <a:spcPts val="0"/>
+              </a:spcBef>
+              <a:buFont typeface="Arial" panose="020B0604020202020204" pitchFamily="34" charset="0"/>
+              <a:buChar char="•"/>
+              <a:defRPr sz="1500" kern="1200">
+                <a:solidFill>
+                  <a:schemeClr val="bg1"/>
+                </a:solidFill>
+                <a:latin typeface="+mn-lt"/>
+                <a:ea typeface="+mn-ea"/>
+                <a:cs typeface="+mn-cs"/>
+              </a:defRPr>
+            </a:lvl4pPr>
+            <a:lvl5pPr marL="900000" indent="-180000" algn="l" defTabSz="685800" rtl="0" eaLnBrk="1" latinLnBrk="0" hangingPunct="1">
+              <a:lnSpc>
+                <a:spcPct val="120000"/>
+              </a:lnSpc>
+              <a:spcBef>
+                <a:spcPts val="0"/>
+              </a:spcBef>
+              <a:buFont typeface="Arial" panose="020B0604020202020204" pitchFamily="34" charset="0"/>
+              <a:buChar char="•"/>
+              <a:defRPr sz="1500" kern="1200">
+                <a:solidFill>
+                  <a:schemeClr val="bg1"/>
+                </a:solidFill>
+                <a:latin typeface="+mn-lt"/>
+                <a:ea typeface="+mn-ea"/>
+                <a:cs typeface="+mn-cs"/>
+              </a:defRPr>
+            </a:lvl5pPr>
+            <a:lvl6pPr marL="1885950" indent="-171450" algn="l" defTabSz="685800" rtl="0" eaLnBrk="1" latinLnBrk="0" hangingPunct="1">
+              <a:lnSpc>
+                <a:spcPct val="90000"/>
+              </a:lnSpc>
+              <a:spcBef>
+                <a:spcPts val="375"/>
+              </a:spcBef>
+              <a:buFont typeface="Arial" panose="020B0604020202020204" pitchFamily="34" charset="0"/>
+              <a:buChar char="•"/>
+              <a:defRPr sz="1500" kern="1200">
+                <a:solidFill>
+                  <a:schemeClr val="tx1"/>
+                </a:solidFill>
+                <a:latin typeface="+mn-lt"/>
+                <a:ea typeface="+mn-ea"/>
+                <a:cs typeface="+mn-cs"/>
+              </a:defRPr>
+            </a:lvl6pPr>
+            <a:lvl7pPr marL="2228850" indent="-171450" algn="l" defTabSz="685800" rtl="0" eaLnBrk="1" latinLnBrk="0" hangingPunct="1">
+              <a:lnSpc>
+                <a:spcPct val="90000"/>
+              </a:lnSpc>
+              <a:spcBef>
+                <a:spcPts val="375"/>
+              </a:spcBef>
+              <a:buFont typeface="Arial" panose="020B0604020202020204" pitchFamily="34" charset="0"/>
+              <a:buChar char="•"/>
+              <a:defRPr sz="1500" kern="1200">
+                <a:solidFill>
+                  <a:schemeClr val="tx1"/>
+                </a:solidFill>
+                <a:latin typeface="+mn-lt"/>
+                <a:ea typeface="+mn-ea"/>
+                <a:cs typeface="+mn-cs"/>
+              </a:defRPr>
+            </a:lvl7pPr>
+            <a:lvl8pPr marL="2571750" indent="-171450" algn="l" defTabSz="685800" rtl="0" eaLnBrk="1" latinLnBrk="0" hangingPunct="1">
+              <a:lnSpc>
+                <a:spcPct val="90000"/>
+              </a:lnSpc>
+              <a:spcBef>
+                <a:spcPts val="375"/>
+              </a:spcBef>
+              <a:buFont typeface="Arial" panose="020B0604020202020204" pitchFamily="34" charset="0"/>
+              <a:buChar char="•"/>
+              <a:defRPr sz="1500" kern="1200">
+                <a:solidFill>
+                  <a:schemeClr val="tx1"/>
+                </a:solidFill>
+                <a:latin typeface="+mn-lt"/>
+                <a:ea typeface="+mn-ea"/>
+                <a:cs typeface="+mn-cs"/>
+              </a:defRPr>
+            </a:lvl8pPr>
+            <a:lvl9pPr marL="2914650" indent="-171450" algn="l" defTabSz="685800" rtl="0" eaLnBrk="1" latinLnBrk="0" hangingPunct="1">
+              <a:lnSpc>
+                <a:spcPct val="90000"/>
+              </a:lnSpc>
+              <a:spcBef>
+                <a:spcPts val="375"/>
+              </a:spcBef>
+              <a:buFont typeface="Arial" panose="020B0604020202020204" pitchFamily="34" charset="0"/>
+              <a:buChar char="•"/>
+              <a:defRPr sz="1500" kern="1200">
+                <a:solidFill>
+                  <a:schemeClr val="tx1"/>
+                </a:solidFill>
+                <a:latin typeface="+mn-lt"/>
+                <a:ea typeface="+mn-ea"/>
+                <a:cs typeface="+mn-cs"/>
+              </a:defRPr>
+            </a:lvl9pPr>
+          </a:lstStyle>
+          <a:p>
+            <a:r>
+              <a:rPr lang="nl-NL" i="1" dirty="0" err="1"/>
+              <a:t>max_leaf_nodes</a:t>
+            </a:r>
+            <a:r>
+              <a:rPr lang="nl-NL" i="1" dirty="0"/>
+              <a:t>: maximale aantal </a:t>
+            </a:r>
+            <a:r>
+              <a:rPr lang="nl-NL" i="1" dirty="0" err="1"/>
+              <a:t>leaves</a:t>
+            </a:r>
+            <a:endParaRPr lang="nl-NL" i="1" dirty="0"/>
+          </a:p>
+          <a:p>
+            <a:r>
+              <a:rPr lang="nl-NL" i="1" dirty="0" err="1"/>
+              <a:t>min_impurity_decrease</a:t>
+            </a:r>
+            <a:r>
+              <a:rPr lang="nl-NL" i="1" dirty="0"/>
+              <a:t>: splits een node in </a:t>
+            </a:r>
+            <a:r>
+              <a:rPr lang="nl-NL" i="1" dirty="0" err="1"/>
+              <a:t>leaves</a:t>
+            </a:r>
+            <a:r>
+              <a:rPr lang="nl-NL" i="1" dirty="0"/>
+              <a:t> wanneer de “</a:t>
+            </a:r>
+            <a:r>
+              <a:rPr lang="nl-NL" i="1" dirty="0" err="1"/>
+              <a:t>impuurheid</a:t>
+            </a:r>
+            <a:r>
+              <a:rPr lang="nl-NL" i="1" dirty="0"/>
+              <a:t>” zo veel kleiner wordt</a:t>
+            </a:r>
+          </a:p>
+          <a:p>
+            <a:r>
+              <a:rPr lang="nl-NL" i="1" dirty="0" err="1"/>
+              <a:t>min_samples_split</a:t>
+            </a:r>
+            <a:r>
+              <a:rPr lang="nl-NL" i="1" dirty="0"/>
+              <a:t>: minimum hoeveelheid training samples in een node om te splitten</a:t>
+            </a:r>
+          </a:p>
+          <a:p>
+            <a:r>
+              <a:rPr lang="nl-NL" i="1" dirty="0" err="1"/>
+              <a:t>min_samples_leaf</a:t>
+            </a:r>
+            <a:r>
+              <a:rPr lang="nl-NL" i="1" dirty="0"/>
+              <a:t>: minimum hoeveelheid training samples dat over moet blijven in een </a:t>
+            </a:r>
+            <a:r>
+              <a:rPr lang="nl-NL" i="1" dirty="0" err="1"/>
+              <a:t>leaf</a:t>
+            </a:r>
+            <a:r>
+              <a:rPr lang="nl-NL" i="1" dirty="0"/>
+              <a:t> na splitsing</a:t>
+            </a:r>
+          </a:p>
+          <a:p>
+            <a:r>
+              <a:rPr lang="nl-NL" i="1" dirty="0" err="1"/>
+              <a:t>max_features</a:t>
+            </a:r>
+            <a:r>
+              <a:rPr lang="nl-NL" i="1" dirty="0"/>
+              <a:t> = m</a:t>
+            </a:r>
+          </a:p>
+          <a:p>
+            <a:r>
+              <a:rPr lang="nl-NL" i="1" dirty="0"/>
+              <a:t>n</a:t>
+            </a:r>
+            <a:r>
+              <a:rPr lang="nl-NL" i="1"/>
+              <a:t>_</a:t>
+            </a:r>
+            <a:r>
+              <a:rPr lang="nl-NL" i="1" dirty="0" err="1"/>
+              <a:t>estimators</a:t>
+            </a:r>
+            <a:r>
+              <a:rPr lang="nl-NL" i="1" dirty="0"/>
+              <a:t> = T</a:t>
+            </a:r>
+          </a:p>
+          <a:p>
+            <a:endParaRPr lang="nl-NL" i="1" dirty="0"/>
+          </a:p>
+        </p:txBody>
+      </p:sp>
+    </p:spTree>
+    <p:extLst>
+      <p:ext uri="{BB962C8B-B14F-4D97-AF65-F5344CB8AC3E}">
+        <p14:creationId xmlns:p14="http://schemas.microsoft.com/office/powerpoint/2010/main" val="3838770113"/>
+      </p:ext>
+    </p:extLst>
+  </p:cSld>
+  <p:clrMapOvr>
+    <a:masterClrMapping/>
+  </p:clrMapOvr>
+</p:sld>
+</file>
+
+<file path=ppt/slides/slide24.xml><?xml version="1.0" encoding="utf-8"?>
+<p:sld xmlns:a="http://schemas.openxmlformats.org/drawingml/2006/main" xmlns:r="http://schemas.openxmlformats.org/officeDocument/2006/relationships" xmlns:p="http://schemas.openxmlformats.org/presentationml/2006/main">
+  <p:cSld>
+    <p:spTree>
+      <p:nvGrpSpPr>
+        <p:cNvPr id="1" name=""/>
+        <p:cNvGrpSpPr/>
+        <p:nvPr/>
+      </p:nvGrpSpPr>
+      <p:grpSpPr>
+        <a:xfrm>
+          <a:off x="0" y="0"/>
+          <a:ext cx="0" cy="0"/>
+          <a:chOff x="0" y="0"/>
+          <a:chExt cx="0" cy="0"/>
+        </a:xfrm>
+      </p:grpSpPr>
+      <p:sp>
+        <p:nvSpPr>
+          <p:cNvPr id="2" name="Title 1"/>
+          <p:cNvSpPr>
+            <a:spLocks noGrp="1"/>
+          </p:cNvSpPr>
+          <p:nvPr>
+            <p:ph type="title"/>
+          </p:nvPr>
+        </p:nvSpPr>
+        <p:spPr/>
+        <p:txBody>
+          <a:bodyPr/>
+          <a:lstStyle/>
+          <a:p>
+            <a:r>
+              <a:rPr lang="nl-NL" dirty="0"/>
               <a:t>Naslagwerk</a:t>
             </a:r>
           </a:p>
@@ -10810,7 +11739,7 @@
           <a:p>
             <a:fld id="{14F1411D-0280-154F-AEAC-4C20B7AA46B2}" type="slidenum">
               <a:rPr lang="nl-NL" smtClean="0"/>
-              <a:t>22</a:t>
+              <a:t>24</a:t>
             </a:fld>
             <a:endParaRPr lang="nl-NL"/>
           </a:p>
@@ -10854,7 +11783,7 @@
 </p:sld>
 </file>
 
-<file path=ppt/slides/slide23.xml><?xml version="1.0" encoding="utf-8"?>
+<file path=ppt/slides/slide25.xml><?xml version="1.0" encoding="utf-8"?>
 <p:sld xmlns:a="http://schemas.openxmlformats.org/drawingml/2006/main" xmlns:r="http://schemas.openxmlformats.org/officeDocument/2006/relationships" xmlns:p="http://schemas.openxmlformats.org/presentationml/2006/main">
   <p:cSld>
     <p:spTree>
@@ -11020,7 +11949,7 @@
           <a:p>
             <a:fld id="{14F1411D-0280-154F-AEAC-4C20B7AA46B2}" type="slidenum">
               <a:rPr lang="nl-NL" smtClean="0"/>
-              <a:t>23</a:t>
+              <a:t>25</a:t>
             </a:fld>
             <a:endParaRPr lang="nl-NL"/>
           </a:p>
@@ -11474,9 +12403,12 @@
               <a:buNone/>
             </a:pPr>
             <a:r>
-              <a:rPr lang="nl-NL" dirty="0"/>
-              <a:t>GITHUB REPO</a:t>
-            </a:r>
+              <a:rPr lang="nl-NL" dirty="0">
+                <a:hlinkClick r:id="rId2"/>
+              </a:rPr>
+              <a:t>https://bit.ly/2VRdLSz</a:t>
+            </a:r>
+            <a:endParaRPr lang="nl-NL" dirty="0"/>
           </a:p>
         </p:txBody>
       </p:sp>
@@ -11551,7 +12483,7 @@
           </p:nvPr>
         </p:nvPicPr>
         <p:blipFill>
-          <a:blip r:embed="rId2">
+          <a:blip r:embed="rId3">
             <a:extLst>
               <a:ext uri="{28A0092B-C50C-407E-A947-70E740481C1C}">
                 <a14:useLocalDpi xmlns:a14="http://schemas.microsoft.com/office/drawing/2010/main" val="0"/>
@@ -11893,7 +12825,7 @@
           <a:p>
             <a:r>
               <a:rPr lang="nl-NL" dirty="0"/>
-              <a:t>Verdeel je in teams van 2-3</a:t>
+              <a:t>Verdeel je in teams van 2</a:t>
             </a:r>
           </a:p>
           <a:p>

</xml_diff>